<commit_message>
App Mockup added. Cloeses #5
</commit_message>
<xml_diff>
--- a/presentation/BuPl_concept-presentation-GitFit.pptx
+++ b/presentation/BuPl_concept-presentation-GitFit.pptx
@@ -112,6 +112,22 @@
       </a:defRPr>
     </a:lvl9pPr>
   </p:defaultTextStyle>
+  <p:extLst>
+    <p:ext uri="{EFAFB233-063F-42B5-8137-9DF3F51BA10A}">
+      <p15:sldGuideLst xmlns:p15="http://schemas.microsoft.com/office/powerpoint/2012/main">
+        <p15:guide id="1" orient="horz" pos="2160">
+          <p15:clr>
+            <a:srgbClr val="A4A3A4"/>
+          </p15:clr>
+        </p15:guide>
+        <p15:guide id="2" pos="2880">
+          <p15:clr>
+            <a:srgbClr val="A4A3A4"/>
+          </p15:clr>
+        </p15:guide>
+      </p15:sldGuideLst>
+    </p:ext>
+  </p:extLst>
 </p:presentation>
 </file>
 
@@ -296,7 +312,7 @@
           <a:p>
             <a:fld id="{08D9589F-252C-704B-9B79-8E17BF3570A5}" type="datetimeFigureOut">
               <a:rPr lang="de-DE" smtClean="0"/>
-              <a:t>06.10.16</a:t>
+              <a:t>06.10.2016</a:t>
             </a:fld>
             <a:endParaRPr lang="de-DE"/>
           </a:p>
@@ -466,7 +482,7 @@
           <a:p>
             <a:fld id="{08D9589F-252C-704B-9B79-8E17BF3570A5}" type="datetimeFigureOut">
               <a:rPr lang="de-DE" smtClean="0"/>
-              <a:t>06.10.16</a:t>
+              <a:t>06.10.2016</a:t>
             </a:fld>
             <a:endParaRPr lang="de-DE"/>
           </a:p>
@@ -646,7 +662,7 @@
           <a:p>
             <a:fld id="{08D9589F-252C-704B-9B79-8E17BF3570A5}" type="datetimeFigureOut">
               <a:rPr lang="de-DE" smtClean="0"/>
-              <a:t>06.10.16</a:t>
+              <a:t>06.10.2016</a:t>
             </a:fld>
             <a:endParaRPr lang="de-DE"/>
           </a:p>
@@ -816,7 +832,7 @@
           <a:p>
             <a:fld id="{08D9589F-252C-704B-9B79-8E17BF3570A5}" type="datetimeFigureOut">
               <a:rPr lang="de-DE" smtClean="0"/>
-              <a:t>06.10.16</a:t>
+              <a:t>06.10.2016</a:t>
             </a:fld>
             <a:endParaRPr lang="de-DE"/>
           </a:p>
@@ -1062,7 +1078,7 @@
           <a:p>
             <a:fld id="{08D9589F-252C-704B-9B79-8E17BF3570A5}" type="datetimeFigureOut">
               <a:rPr lang="de-DE" smtClean="0"/>
-              <a:t>06.10.16</a:t>
+              <a:t>06.10.2016</a:t>
             </a:fld>
             <a:endParaRPr lang="de-DE"/>
           </a:p>
@@ -1350,7 +1366,7 @@
           <a:p>
             <a:fld id="{08D9589F-252C-704B-9B79-8E17BF3570A5}" type="datetimeFigureOut">
               <a:rPr lang="de-DE" smtClean="0"/>
-              <a:t>06.10.16</a:t>
+              <a:t>06.10.2016</a:t>
             </a:fld>
             <a:endParaRPr lang="de-DE"/>
           </a:p>
@@ -1772,7 +1788,7 @@
           <a:p>
             <a:fld id="{08D9589F-252C-704B-9B79-8E17BF3570A5}" type="datetimeFigureOut">
               <a:rPr lang="de-DE" smtClean="0"/>
-              <a:t>06.10.16</a:t>
+              <a:t>06.10.2016</a:t>
             </a:fld>
             <a:endParaRPr lang="de-DE"/>
           </a:p>
@@ -1890,7 +1906,7 @@
           <a:p>
             <a:fld id="{08D9589F-252C-704B-9B79-8E17BF3570A5}" type="datetimeFigureOut">
               <a:rPr lang="de-DE" smtClean="0"/>
-              <a:t>06.10.16</a:t>
+              <a:t>06.10.2016</a:t>
             </a:fld>
             <a:endParaRPr lang="de-DE"/>
           </a:p>
@@ -1985,7 +2001,7 @@
           <a:p>
             <a:fld id="{08D9589F-252C-704B-9B79-8E17BF3570A5}" type="datetimeFigureOut">
               <a:rPr lang="de-DE" smtClean="0"/>
-              <a:t>06.10.16</a:t>
+              <a:t>06.10.2016</a:t>
             </a:fld>
             <a:endParaRPr lang="de-DE"/>
           </a:p>
@@ -2262,7 +2278,7 @@
           <a:p>
             <a:fld id="{08D9589F-252C-704B-9B79-8E17BF3570A5}" type="datetimeFigureOut">
               <a:rPr lang="de-DE" smtClean="0"/>
-              <a:t>06.10.16</a:t>
+              <a:t>06.10.2016</a:t>
             </a:fld>
             <a:endParaRPr lang="de-DE"/>
           </a:p>
@@ -2515,7 +2531,7 @@
           <a:p>
             <a:fld id="{08D9589F-252C-704B-9B79-8E17BF3570A5}" type="datetimeFigureOut">
               <a:rPr lang="de-DE" smtClean="0"/>
-              <a:t>06.10.16</a:t>
+              <a:t>06.10.2016</a:t>
             </a:fld>
             <a:endParaRPr lang="de-DE"/>
           </a:p>
@@ -2728,7 +2744,7 @@
           <a:p>
             <a:fld id="{08D9589F-252C-704B-9B79-8E17BF3570A5}" type="datetimeFigureOut">
               <a:rPr lang="de-DE" smtClean="0"/>
-              <a:t>06.10.16</a:t>
+              <a:t>06.10.2016</a:t>
             </a:fld>
             <a:endParaRPr lang="de-DE"/>
           </a:p>
@@ -3282,7 +3298,7 @@
   <p:timing>
     <p:tnLst>
       <p:par>
-        <p:cTn xmlns:p14="http://schemas.microsoft.com/office/powerpoint/2010/main" id="1" dur="indefinite" restart="never" nodeType="tmRoot"/>
+        <p:cTn id="1" dur="indefinite" restart="never" nodeType="tmRoot"/>
       </p:par>
     </p:tnLst>
   </p:timing>
@@ -3426,7 +3442,7 @@
   <p:timing>
     <p:tnLst>
       <p:par>
-        <p:cTn xmlns:p14="http://schemas.microsoft.com/office/powerpoint/2010/main" id="1" dur="indefinite" restart="never" nodeType="tmRoot"/>
+        <p:cTn id="1" dur="indefinite" restart="never" nodeType="tmRoot"/>
       </p:par>
     </p:tnLst>
   </p:timing>
@@ -3499,8 +3515,20 @@
                 <a:tableStyleId>{9D7B26C5-4107-4FEC-AEDC-1716B250A1EF}</a:tableStyleId>
               </a:tblPr>
               <a:tblGrid>
-                <a:gridCol w="2262717"/>
-                <a:gridCol w="5966883"/>
+                <a:gridCol w="2262717">
+                  <a:extLst>
+                    <a:ext uri="{9D8B030D-6E8A-4147-A177-3AD203B41FA5}">
+                      <a16:colId xmlns:a16="http://schemas.microsoft.com/office/drawing/2014/main" val="20000"/>
+                    </a:ext>
+                  </a:extLst>
+                </a:gridCol>
+                <a:gridCol w="5966883">
+                  <a:extLst>
+                    <a:ext uri="{9D8B030D-6E8A-4147-A177-3AD203B41FA5}">
+                      <a16:colId xmlns:a16="http://schemas.microsoft.com/office/drawing/2014/main" val="20001"/>
+                    </a:ext>
+                  </a:extLst>
+                </a:gridCol>
               </a:tblGrid>
               <a:tr h="370840">
                 <a:tc>
@@ -3531,6 +3559,11 @@
                   </a:txBody>
                   <a:tcPr/>
                 </a:tc>
+                <a:extLst>
+                  <a:ext uri="{0D108BD9-81ED-4DB2-BD59-A6C34878D82A}">
+                    <a16:rowId xmlns:a16="http://schemas.microsoft.com/office/drawing/2014/main" val="10000"/>
+                  </a:ext>
+                </a:extLst>
               </a:tr>
               <a:tr h="370840">
                 <a:tc>
@@ -3561,6 +3594,11 @@
                   </a:txBody>
                   <a:tcPr/>
                 </a:tc>
+                <a:extLst>
+                  <a:ext uri="{0D108BD9-81ED-4DB2-BD59-A6C34878D82A}">
+                    <a16:rowId xmlns:a16="http://schemas.microsoft.com/office/drawing/2014/main" val="10001"/>
+                  </a:ext>
+                </a:extLst>
               </a:tr>
               <a:tr h="370840">
                 <a:tc>
@@ -3591,6 +3629,11 @@
                   </a:txBody>
                   <a:tcPr/>
                 </a:tc>
+                <a:extLst>
+                  <a:ext uri="{0D108BD9-81ED-4DB2-BD59-A6C34878D82A}">
+                    <a16:rowId xmlns:a16="http://schemas.microsoft.com/office/drawing/2014/main" val="10002"/>
+                  </a:ext>
+                </a:extLst>
               </a:tr>
               <a:tr h="370840">
                 <a:tc>
@@ -3645,6 +3688,11 @@
                   </a:txBody>
                   <a:tcPr/>
                 </a:tc>
+                <a:extLst>
+                  <a:ext uri="{0D108BD9-81ED-4DB2-BD59-A6C34878D82A}">
+                    <a16:rowId xmlns:a16="http://schemas.microsoft.com/office/drawing/2014/main" val="10003"/>
+                  </a:ext>
+                </a:extLst>
               </a:tr>
               <a:tr h="370840">
                 <a:tc>
@@ -3675,6 +3723,11 @@
                   </a:txBody>
                   <a:tcPr/>
                 </a:tc>
+                <a:extLst>
+                  <a:ext uri="{0D108BD9-81ED-4DB2-BD59-A6C34878D82A}">
+                    <a16:rowId xmlns:a16="http://schemas.microsoft.com/office/drawing/2014/main" val="10004"/>
+                  </a:ext>
+                </a:extLst>
               </a:tr>
               <a:tr h="370840">
                 <a:tc>
@@ -3709,6 +3762,11 @@
                   </a:txBody>
                   <a:tcPr/>
                 </a:tc>
+                <a:extLst>
+                  <a:ext uri="{0D108BD9-81ED-4DB2-BD59-A6C34878D82A}">
+                    <a16:rowId xmlns:a16="http://schemas.microsoft.com/office/drawing/2014/main" val="10005"/>
+                  </a:ext>
+                </a:extLst>
               </a:tr>
               <a:tr h="370840">
                 <a:tc>
@@ -3747,6 +3805,11 @@
                   </a:txBody>
                   <a:tcPr/>
                 </a:tc>
+                <a:extLst>
+                  <a:ext uri="{0D108BD9-81ED-4DB2-BD59-A6C34878D82A}">
+                    <a16:rowId xmlns:a16="http://schemas.microsoft.com/office/drawing/2014/main" val="10006"/>
+                  </a:ext>
+                </a:extLst>
               </a:tr>
               <a:tr h="370840">
                 <a:tc>
@@ -3777,6 +3840,11 @@
                   </a:txBody>
                   <a:tcPr/>
                 </a:tc>
+                <a:extLst>
+                  <a:ext uri="{0D108BD9-81ED-4DB2-BD59-A6C34878D82A}">
+                    <a16:rowId xmlns:a16="http://schemas.microsoft.com/office/drawing/2014/main" val="10007"/>
+                  </a:ext>
+                </a:extLst>
               </a:tr>
               <a:tr h="370840">
                 <a:tc>
@@ -3811,6 +3879,11 @@
                   </a:txBody>
                   <a:tcPr/>
                 </a:tc>
+                <a:extLst>
+                  <a:ext uri="{0D108BD9-81ED-4DB2-BD59-A6C34878D82A}">
+                    <a16:rowId xmlns:a16="http://schemas.microsoft.com/office/drawing/2014/main" val="10008"/>
+                  </a:ext>
+                </a:extLst>
               </a:tr>
               <a:tr h="370840">
                 <a:tc>
@@ -3841,6 +3914,11 @@
                   </a:txBody>
                   <a:tcPr/>
                 </a:tc>
+                <a:extLst>
+                  <a:ext uri="{0D108BD9-81ED-4DB2-BD59-A6C34878D82A}">
+                    <a16:rowId xmlns:a16="http://schemas.microsoft.com/office/drawing/2014/main" val="10009"/>
+                  </a:ext>
+                </a:extLst>
               </a:tr>
             </a:tbl>
           </a:graphicData>
@@ -3859,7 +3937,7 @@
   <p:timing>
     <p:tnLst>
       <p:par>
-        <p:cTn xmlns:p14="http://schemas.microsoft.com/office/powerpoint/2010/main" id="1" dur="indefinite" restart="never" nodeType="tmRoot"/>
+        <p:cTn id="1" dur="indefinite" restart="never" nodeType="tmRoot"/>
       </p:par>
     </p:tnLst>
   </p:timing>
@@ -3944,7 +4022,7 @@
   <p:timing>
     <p:tnLst>
       <p:par>
-        <p:cTn xmlns:p14="http://schemas.microsoft.com/office/powerpoint/2010/main" id="1" dur="indefinite" restart="never" nodeType="tmRoot"/>
+        <p:cTn id="1" dur="indefinite" restart="never" nodeType="tmRoot"/>
       </p:par>
     </p:tnLst>
   </p:timing>
@@ -3991,25 +4069,35 @@
           </a:p>
         </p:txBody>
       </p:sp>
-      <p:sp>
-        <p:nvSpPr>
-          <p:cNvPr id="3" name="Inhaltsplatzhalter 2"/>
-          <p:cNvSpPr>
-            <a:spLocks noGrp="1"/>
-          </p:cNvSpPr>
+      <p:pic>
+        <p:nvPicPr>
+          <p:cNvPr id="6" name="Inhaltsplatzhalter 5"/>
+          <p:cNvPicPr>
+            <a:picLocks noGrp="1" noChangeAspect="1"/>
+          </p:cNvPicPr>
           <p:nvPr>
             <p:ph idx="1"/>
           </p:nvPr>
-        </p:nvSpPr>
-        <p:spPr/>
-        <p:txBody>
-          <a:bodyPr/>
-          <a:lstStyle/>
-          <a:p>
-            <a:endParaRPr lang="de-DE"/>
-          </a:p>
-        </p:txBody>
-      </p:sp>
+        </p:nvPicPr>
+        <p:blipFill>
+          <a:blip r:embed="rId2">
+            <a:extLst>
+              <a:ext uri="{28A0092B-C50C-407E-A947-70E740481C1C}">
+                <a14:useLocalDpi xmlns:a14="http://schemas.microsoft.com/office/drawing/2010/main" val="0"/>
+              </a:ext>
+            </a:extLst>
+          </a:blip>
+          <a:stretch>
+            <a:fillRect/>
+          </a:stretch>
+        </p:blipFill>
+        <p:spPr>
+          <a:xfrm>
+            <a:off x="457200" y="1933729"/>
+            <a:ext cx="8229600" cy="3858904"/>
+          </a:xfrm>
+        </p:spPr>
+      </p:pic>
     </p:spTree>
     <p:extLst>
       <p:ext uri="{BB962C8B-B14F-4D97-AF65-F5344CB8AC3E}">
@@ -4023,7 +4111,7 @@
   <p:timing>
     <p:tnLst>
       <p:par>
-        <p:cTn xmlns:p14="http://schemas.microsoft.com/office/powerpoint/2010/main" id="1" dur="indefinite" restart="never" nodeType="tmRoot"/>
+        <p:cTn id="1" dur="indefinite" restart="never" nodeType="tmRoot"/>
       </p:par>
     </p:tnLst>
   </p:timing>
@@ -4102,7 +4190,7 @@
   <p:timing>
     <p:tnLst>
       <p:par>
-        <p:cTn xmlns:p14="http://schemas.microsoft.com/office/powerpoint/2010/main" id="1" dur="indefinite" restart="never" nodeType="tmRoot"/>
+        <p:cTn id="1" dur="indefinite" restart="never" nodeType="tmRoot"/>
       </p:par>
     </p:tnLst>
   </p:timing>

</xml_diff>

<commit_message>
slide Der Kunde hinzugefügt
</commit_message>
<xml_diff>
--- a/presentation/BuPl_concept-presentation-GitFit.pptx
+++ b/presentation/BuPl_concept-presentation-GitFit.pptx
@@ -8,12 +8,13 @@
     <p:sldId id="256" r:id="rId2"/>
     <p:sldId id="257" r:id="rId3"/>
     <p:sldId id="258" r:id="rId4"/>
-    <p:sldId id="259" r:id="rId5"/>
-    <p:sldId id="262" r:id="rId6"/>
-    <p:sldId id="263" r:id="rId7"/>
-    <p:sldId id="260" r:id="rId8"/>
-    <p:sldId id="264" r:id="rId9"/>
-    <p:sldId id="261" r:id="rId10"/>
+    <p:sldId id="265" r:id="rId5"/>
+    <p:sldId id="259" r:id="rId6"/>
+    <p:sldId id="262" r:id="rId7"/>
+    <p:sldId id="263" r:id="rId8"/>
+    <p:sldId id="260" r:id="rId9"/>
+    <p:sldId id="264" r:id="rId10"/>
+    <p:sldId id="261" r:id="rId11"/>
   </p:sldIdLst>
   <p:sldSz cx="9144000" cy="6858000" type="screen4x3"/>
   <p:notesSz cx="6858000" cy="9144000"/>
@@ -3174,6 +3175,120 @@
 </p:sld>
 </file>
 
+<file path=ppt/slides/slide10.xml><?xml version="1.0" encoding="utf-8"?>
+<p:sld xmlns:a="http://schemas.openxmlformats.org/drawingml/2006/main" xmlns:r="http://schemas.openxmlformats.org/officeDocument/2006/relationships" xmlns:p="http://schemas.openxmlformats.org/presentationml/2006/main">
+  <p:cSld>
+    <p:spTree>
+      <p:nvGrpSpPr>
+        <p:cNvPr id="1" name=""/>
+        <p:cNvGrpSpPr/>
+        <p:nvPr/>
+      </p:nvGrpSpPr>
+      <p:grpSpPr>
+        <a:xfrm>
+          <a:off x="0" y="0"/>
+          <a:ext cx="0" cy="0"/>
+          <a:chOff x="0" y="0"/>
+          <a:chExt cx="0" cy="0"/>
+        </a:xfrm>
+      </p:grpSpPr>
+      <p:sp>
+        <p:nvSpPr>
+          <p:cNvPr id="2" name="Titel 1"/>
+          <p:cNvSpPr>
+            <a:spLocks noGrp="1"/>
+          </p:cNvSpPr>
+          <p:nvPr>
+            <p:ph type="title"/>
+          </p:nvPr>
+        </p:nvSpPr>
+        <p:spPr/>
+        <p:txBody>
+          <a:bodyPr/>
+          <a:lstStyle/>
+          <a:p>
+            <a:r>
+              <a:rPr lang="de-DE" dirty="0" smtClean="0"/>
+              <a:t>Ertragsmechanik</a:t>
+            </a:r>
+            <a:endParaRPr lang="de-DE" dirty="0"/>
+          </a:p>
+        </p:txBody>
+      </p:sp>
+      <p:sp>
+        <p:nvSpPr>
+          <p:cNvPr id="3" name="Inhaltsplatzhalter 2"/>
+          <p:cNvSpPr>
+            <a:spLocks noGrp="1"/>
+          </p:cNvSpPr>
+          <p:nvPr>
+            <p:ph idx="1"/>
+          </p:nvPr>
+        </p:nvSpPr>
+        <p:spPr/>
+        <p:txBody>
+          <a:bodyPr/>
+          <a:lstStyle/>
+          <a:p>
+            <a:r>
+              <a:rPr lang="de-DE" dirty="0" smtClean="0"/>
+              <a:t>Abo-Modell</a:t>
+            </a:r>
+          </a:p>
+          <a:p>
+            <a:pPr lvl="1"/>
+            <a:r>
+              <a:rPr lang="de-DE" dirty="0" smtClean="0"/>
+              <a:t>Nach Anzahl Mitglieder / </a:t>
+            </a:r>
+            <a:r>
+              <a:rPr lang="de-DE" dirty="0" err="1" smtClean="0"/>
+              <a:t>grösse</a:t>
+            </a:r>
+            <a:r>
+              <a:rPr lang="de-DE" dirty="0" smtClean="0"/>
+              <a:t> Fitnesscenter</a:t>
+            </a:r>
+          </a:p>
+          <a:p>
+            <a:r>
+              <a:rPr lang="de-DE" dirty="0" smtClean="0"/>
+              <a:t>Online Dienst (Kundenbindung)</a:t>
+            </a:r>
+          </a:p>
+          <a:p>
+            <a:r>
+              <a:rPr lang="de-DE" dirty="0" err="1" smtClean="0"/>
+              <a:t>IoT</a:t>
+            </a:r>
+            <a:r>
+              <a:rPr lang="de-DE" dirty="0" smtClean="0"/>
+              <a:t>-Geräte in Zukunft möglich</a:t>
+            </a:r>
+          </a:p>
+          <a:p>
+            <a:pPr lvl="1"/>
+            <a:r>
+              <a:rPr lang="de-DE" dirty="0" smtClean="0"/>
+              <a:t>Smarte Fitnessgeräte</a:t>
+            </a:r>
+            <a:endParaRPr lang="de-DE" dirty="0"/>
+          </a:p>
+        </p:txBody>
+      </p:sp>
+    </p:spTree>
+    <p:extLst>
+      <p:ext uri="{BB962C8B-B14F-4D97-AF65-F5344CB8AC3E}">
+        <p14:creationId xmlns:p14="http://schemas.microsoft.com/office/powerpoint/2010/main" val="1808634813"/>
+      </p:ext>
+    </p:extLst>
+  </p:cSld>
+  <p:clrMapOvr>
+    <a:masterClrMapping/>
+  </p:clrMapOvr>
+</p:sld>
+</file>
+
 <file path=ppt/slides/slide2.xml><?xml version="1.0" encoding="utf-8"?>
 <p:sld xmlns:a="http://schemas.openxmlformats.org/drawingml/2006/main" xmlns:r="http://schemas.openxmlformats.org/officeDocument/2006/relationships" xmlns:p="http://schemas.openxmlformats.org/presentationml/2006/main">
   <p:cSld>
@@ -3450,6 +3565,102 @@
 </file>
 
 <file path=ppt/slides/slide4.xml><?xml version="1.0" encoding="utf-8"?>
+<p:sld xmlns:a="http://schemas.openxmlformats.org/drawingml/2006/main" xmlns:r="http://schemas.openxmlformats.org/officeDocument/2006/relationships" xmlns:p="http://schemas.openxmlformats.org/presentationml/2006/main">
+  <p:cSld>
+    <p:spTree>
+      <p:nvGrpSpPr>
+        <p:cNvPr id="1" name=""/>
+        <p:cNvGrpSpPr/>
+        <p:nvPr/>
+      </p:nvGrpSpPr>
+      <p:grpSpPr>
+        <a:xfrm>
+          <a:off x="0" y="0"/>
+          <a:ext cx="0" cy="0"/>
+          <a:chOff x="0" y="0"/>
+          <a:chExt cx="0" cy="0"/>
+        </a:xfrm>
+      </p:grpSpPr>
+      <p:sp>
+        <p:nvSpPr>
+          <p:cNvPr id="2" name="Titel 1"/>
+          <p:cNvSpPr>
+            <a:spLocks noGrp="1"/>
+          </p:cNvSpPr>
+          <p:nvPr>
+            <p:ph type="title"/>
+          </p:nvPr>
+        </p:nvSpPr>
+        <p:spPr/>
+        <p:txBody>
+          <a:bodyPr/>
+          <a:lstStyle/>
+          <a:p>
+            <a:r>
+              <a:rPr lang="de-CH" dirty="0" smtClean="0"/>
+              <a:t>Der Kunde</a:t>
+            </a:r>
+            <a:endParaRPr lang="de-CH" dirty="0"/>
+          </a:p>
+        </p:txBody>
+      </p:sp>
+      <p:sp>
+        <p:nvSpPr>
+          <p:cNvPr id="3" name="Inhaltsplatzhalter 2"/>
+          <p:cNvSpPr>
+            <a:spLocks noGrp="1"/>
+          </p:cNvSpPr>
+          <p:nvPr>
+            <p:ph idx="1"/>
+          </p:nvPr>
+        </p:nvSpPr>
+        <p:spPr/>
+        <p:txBody>
+          <a:bodyPr/>
+          <a:lstStyle/>
+          <a:p>
+            <a:r>
+              <a:rPr lang="de-CH" dirty="0" smtClean="0"/>
+              <a:t>Fitnesscenter als primärer Kunde</a:t>
+            </a:r>
+          </a:p>
+          <a:p>
+            <a:endParaRPr lang="de-CH" dirty="0" smtClean="0"/>
+          </a:p>
+          <a:p>
+            <a:r>
+              <a:rPr lang="de-CH" dirty="0" smtClean="0"/>
+              <a:t>Mitglieder profitieren vom Angebot</a:t>
+            </a:r>
+          </a:p>
+          <a:p>
+            <a:r>
+              <a:rPr lang="de-CH" dirty="0" smtClean="0"/>
+              <a:t>Fitnesscenter profitiert von zufrieden Kunden</a:t>
+            </a:r>
+          </a:p>
+          <a:p>
+            <a:endParaRPr lang="de-CH" dirty="0" smtClean="0"/>
+          </a:p>
+          <a:p>
+            <a:endParaRPr lang="de-CH" dirty="0"/>
+          </a:p>
+        </p:txBody>
+      </p:sp>
+    </p:spTree>
+    <p:extLst>
+      <p:ext uri="{BB962C8B-B14F-4D97-AF65-F5344CB8AC3E}">
+        <p14:creationId xmlns:p14="http://schemas.microsoft.com/office/powerpoint/2010/main" val="2545300365"/>
+      </p:ext>
+    </p:extLst>
+  </p:cSld>
+  <p:clrMapOvr>
+    <a:masterClrMapping/>
+  </p:clrMapOvr>
+</p:sld>
+</file>
+
+<file path=ppt/slides/slide5.xml><?xml version="1.0" encoding="utf-8"?>
 <p:sld xmlns:a="http://schemas.openxmlformats.org/drawingml/2006/main" xmlns:r="http://schemas.openxmlformats.org/officeDocument/2006/relationships" xmlns:p="http://schemas.openxmlformats.org/presentationml/2006/main">
   <p:cSld>
     <p:spTree>
@@ -3944,7 +4155,7 @@
 </p:sld>
 </file>
 
-<file path=ppt/slides/slide5.xml><?xml version="1.0" encoding="utf-8"?>
+<file path=ppt/slides/slide6.xml><?xml version="1.0" encoding="utf-8"?>
 <p:sld xmlns:a="http://schemas.openxmlformats.org/drawingml/2006/main" xmlns:r="http://schemas.openxmlformats.org/officeDocument/2006/relationships" xmlns:p="http://schemas.openxmlformats.org/presentationml/2006/main">
   <p:cSld>
     <p:spTree>
@@ -4029,7 +4240,7 @@
 </p:sld>
 </file>
 
-<file path=ppt/slides/slide6.xml><?xml version="1.0" encoding="utf-8"?>
+<file path=ppt/slides/slide7.xml><?xml version="1.0" encoding="utf-8"?>
 <p:sld xmlns:a="http://schemas.openxmlformats.org/drawingml/2006/main" xmlns:r="http://schemas.openxmlformats.org/officeDocument/2006/relationships" xmlns:p="http://schemas.openxmlformats.org/presentationml/2006/main">
   <p:cSld>
     <p:spTree>
@@ -4118,7 +4329,7 @@
 </p:sld>
 </file>
 
-<file path=ppt/slides/slide7.xml><?xml version="1.0" encoding="utf-8"?>
+<file path=ppt/slides/slide8.xml><?xml version="1.0" encoding="utf-8"?>
 <p:sld xmlns:a="http://schemas.openxmlformats.org/drawingml/2006/main" xmlns:r="http://schemas.openxmlformats.org/officeDocument/2006/relationships" xmlns:p="http://schemas.openxmlformats.org/presentationml/2006/main">
   <p:cSld>
     <p:spTree>
@@ -4197,78 +4408,6 @@
 </p:sld>
 </file>
 
-<file path=ppt/slides/slide8.xml><?xml version="1.0" encoding="utf-8"?>
-<p:sld xmlns:a="http://schemas.openxmlformats.org/drawingml/2006/main" xmlns:r="http://schemas.openxmlformats.org/officeDocument/2006/relationships" xmlns:p="http://schemas.openxmlformats.org/presentationml/2006/main">
-  <p:cSld>
-    <p:spTree>
-      <p:nvGrpSpPr>
-        <p:cNvPr id="1" name=""/>
-        <p:cNvGrpSpPr/>
-        <p:nvPr/>
-      </p:nvGrpSpPr>
-      <p:grpSpPr>
-        <a:xfrm>
-          <a:off x="0" y="0"/>
-          <a:ext cx="0" cy="0"/>
-          <a:chOff x="0" y="0"/>
-          <a:chExt cx="0" cy="0"/>
-        </a:xfrm>
-      </p:grpSpPr>
-      <p:sp>
-        <p:nvSpPr>
-          <p:cNvPr id="2" name="Titel 1"/>
-          <p:cNvSpPr>
-            <a:spLocks noGrp="1"/>
-          </p:cNvSpPr>
-          <p:nvPr>
-            <p:ph type="title"/>
-          </p:nvPr>
-        </p:nvSpPr>
-        <p:spPr/>
-        <p:txBody>
-          <a:bodyPr/>
-          <a:lstStyle/>
-          <a:p>
-            <a:r>
-              <a:rPr lang="de-DE" dirty="0" smtClean="0"/>
-              <a:t>Kundennutzen</a:t>
-            </a:r>
-            <a:endParaRPr lang="de-DE" dirty="0"/>
-          </a:p>
-        </p:txBody>
-      </p:sp>
-      <p:sp>
-        <p:nvSpPr>
-          <p:cNvPr id="3" name="Inhaltsplatzhalter 2"/>
-          <p:cNvSpPr>
-            <a:spLocks noGrp="1"/>
-          </p:cNvSpPr>
-          <p:nvPr>
-            <p:ph idx="1"/>
-          </p:nvPr>
-        </p:nvSpPr>
-        <p:spPr/>
-        <p:txBody>
-          <a:bodyPr/>
-          <a:lstStyle/>
-          <a:p>
-            <a:endParaRPr lang="de-DE" dirty="0"/>
-          </a:p>
-        </p:txBody>
-      </p:sp>
-    </p:spTree>
-    <p:extLst>
-      <p:ext uri="{BB962C8B-B14F-4D97-AF65-F5344CB8AC3E}">
-        <p14:creationId xmlns:p14="http://schemas.microsoft.com/office/powerpoint/2010/main" val="4132382495"/>
-      </p:ext>
-    </p:extLst>
-  </p:cSld>
-  <p:clrMapOvr>
-    <a:masterClrMapping/>
-  </p:clrMapOvr>
-</p:sld>
-</file>
-
 <file path=ppt/slides/slide9.xml><?xml version="1.0" encoding="utf-8"?>
 <p:sld xmlns:a="http://schemas.openxmlformats.org/drawingml/2006/main" xmlns:r="http://schemas.openxmlformats.org/officeDocument/2006/relationships" xmlns:p="http://schemas.openxmlformats.org/presentationml/2006/main">
   <p:cSld>
@@ -4303,7 +4442,7 @@
           <a:p>
             <a:r>
               <a:rPr lang="de-DE" dirty="0" smtClean="0"/>
-              <a:t>Ertragsmechanik</a:t>
+              <a:t>Kundennutzen</a:t>
             </a:r>
             <a:endParaRPr lang="de-DE" dirty="0"/>
           </a:p>
@@ -4324,48 +4463,6 @@
           <a:bodyPr/>
           <a:lstStyle/>
           <a:p>
-            <a:r>
-              <a:rPr lang="de-DE" dirty="0" smtClean="0"/>
-              <a:t>Abo-Modell</a:t>
-            </a:r>
-          </a:p>
-          <a:p>
-            <a:pPr lvl="1"/>
-            <a:r>
-              <a:rPr lang="de-DE" dirty="0" smtClean="0"/>
-              <a:t>Nach Anzahl Mitglieder / </a:t>
-            </a:r>
-            <a:r>
-              <a:rPr lang="de-DE" dirty="0" err="1" smtClean="0"/>
-              <a:t>grösse</a:t>
-            </a:r>
-            <a:r>
-              <a:rPr lang="de-DE" dirty="0" smtClean="0"/>
-              <a:t> Fitnesscenter</a:t>
-            </a:r>
-          </a:p>
-          <a:p>
-            <a:r>
-              <a:rPr lang="de-DE" dirty="0" smtClean="0"/>
-              <a:t>Online Dienst (Kundenbindung)</a:t>
-            </a:r>
-          </a:p>
-          <a:p>
-            <a:r>
-              <a:rPr lang="de-DE" dirty="0" err="1" smtClean="0"/>
-              <a:t>IoT</a:t>
-            </a:r>
-            <a:r>
-              <a:rPr lang="de-DE" dirty="0" smtClean="0"/>
-              <a:t>-Geräte in Zukunft möglich</a:t>
-            </a:r>
-          </a:p>
-          <a:p>
-            <a:pPr lvl="1"/>
-            <a:r>
-              <a:rPr lang="de-DE" dirty="0" smtClean="0"/>
-              <a:t>Smarte Fitnessgeräte</a:t>
-            </a:r>
             <a:endParaRPr lang="de-DE" dirty="0"/>
           </a:p>
         </p:txBody>
@@ -4373,7 +4470,7 @@
     </p:spTree>
     <p:extLst>
       <p:ext uri="{BB962C8B-B14F-4D97-AF65-F5344CB8AC3E}">
-        <p14:creationId xmlns:p14="http://schemas.microsoft.com/office/powerpoint/2010/main" val="1808634813"/>
+        <p14:creationId xmlns:p14="http://schemas.microsoft.com/office/powerpoint/2010/main" val="4132382495"/>
       </p:ext>
     </p:extLst>
   </p:cSld>

</xml_diff>